<commit_message>
fix typo in =>
</commit_message>
<xml_diff>
--- a/2-Other/Entity Relationships.pptx
+++ b/2-Other/Entity Relationships.pptx
@@ -116,6 +116,11 @@
       </a:defRPr>
     </a:lvl9pPr>
   </p:defaultTextStyle>
+  <p:extLst>
+    <p:ext uri="{EFAFB233-063F-42B5-8137-9DF3F51BA10A}">
+      <p15:sldGuideLst xmlns:p15="http://schemas.microsoft.com/office/powerpoint/2012/main"/>
+    </p:ext>
+  </p:extLst>
 </p:presentation>
 </file>
 
@@ -276,7 +281,7 @@
           <a:p>
             <a:fld id="{349B6121-7632-46E6-99AC-E192A8FE4CA1}" type="datetimeFigureOut">
               <a:rPr lang="de-DE" smtClean="0"/>
-              <a:t>12.09.2023</a:t>
+              <a:t>19.09.2023</a:t>
             </a:fld>
             <a:endParaRPr lang="de-DE"/>
           </a:p>
@@ -476,7 +481,7 @@
           <a:p>
             <a:fld id="{349B6121-7632-46E6-99AC-E192A8FE4CA1}" type="datetimeFigureOut">
               <a:rPr lang="de-DE" smtClean="0"/>
-              <a:t>12.09.2023</a:t>
+              <a:t>19.09.2023</a:t>
             </a:fld>
             <a:endParaRPr lang="de-DE"/>
           </a:p>
@@ -686,7 +691,7 @@
           <a:p>
             <a:fld id="{349B6121-7632-46E6-99AC-E192A8FE4CA1}" type="datetimeFigureOut">
               <a:rPr lang="de-DE" smtClean="0"/>
-              <a:t>12.09.2023</a:t>
+              <a:t>19.09.2023</a:t>
             </a:fld>
             <a:endParaRPr lang="de-DE"/>
           </a:p>
@@ -886,7 +891,7 @@
           <a:p>
             <a:fld id="{349B6121-7632-46E6-99AC-E192A8FE4CA1}" type="datetimeFigureOut">
               <a:rPr lang="de-DE" smtClean="0"/>
-              <a:t>12.09.2023</a:t>
+              <a:t>19.09.2023</a:t>
             </a:fld>
             <a:endParaRPr lang="de-DE"/>
           </a:p>
@@ -1162,7 +1167,7 @@
           <a:p>
             <a:fld id="{349B6121-7632-46E6-99AC-E192A8FE4CA1}" type="datetimeFigureOut">
               <a:rPr lang="de-DE" smtClean="0"/>
-              <a:t>12.09.2023</a:t>
+              <a:t>19.09.2023</a:t>
             </a:fld>
             <a:endParaRPr lang="de-DE"/>
           </a:p>
@@ -1430,7 +1435,7 @@
           <a:p>
             <a:fld id="{349B6121-7632-46E6-99AC-E192A8FE4CA1}" type="datetimeFigureOut">
               <a:rPr lang="de-DE" smtClean="0"/>
-              <a:t>12.09.2023</a:t>
+              <a:t>19.09.2023</a:t>
             </a:fld>
             <a:endParaRPr lang="de-DE"/>
           </a:p>
@@ -1845,7 +1850,7 @@
           <a:p>
             <a:fld id="{349B6121-7632-46E6-99AC-E192A8FE4CA1}" type="datetimeFigureOut">
               <a:rPr lang="de-DE" smtClean="0"/>
-              <a:t>12.09.2023</a:t>
+              <a:t>19.09.2023</a:t>
             </a:fld>
             <a:endParaRPr lang="de-DE"/>
           </a:p>
@@ -1987,7 +1992,7 @@
           <a:p>
             <a:fld id="{349B6121-7632-46E6-99AC-E192A8FE4CA1}" type="datetimeFigureOut">
               <a:rPr lang="de-DE" smtClean="0"/>
-              <a:t>12.09.2023</a:t>
+              <a:t>19.09.2023</a:t>
             </a:fld>
             <a:endParaRPr lang="de-DE"/>
           </a:p>
@@ -2100,7 +2105,7 @@
           <a:p>
             <a:fld id="{349B6121-7632-46E6-99AC-E192A8FE4CA1}" type="datetimeFigureOut">
               <a:rPr lang="de-DE" smtClean="0"/>
-              <a:t>12.09.2023</a:t>
+              <a:t>19.09.2023</a:t>
             </a:fld>
             <a:endParaRPr lang="de-DE"/>
           </a:p>
@@ -2413,7 +2418,7 @@
           <a:p>
             <a:fld id="{349B6121-7632-46E6-99AC-E192A8FE4CA1}" type="datetimeFigureOut">
               <a:rPr lang="de-DE" smtClean="0"/>
-              <a:t>12.09.2023</a:t>
+              <a:t>19.09.2023</a:t>
             </a:fld>
             <a:endParaRPr lang="de-DE"/>
           </a:p>
@@ -2702,7 +2707,7 @@
           <a:p>
             <a:fld id="{349B6121-7632-46E6-99AC-E192A8FE4CA1}" type="datetimeFigureOut">
               <a:rPr lang="de-DE" smtClean="0"/>
-              <a:t>12.09.2023</a:t>
+              <a:t>19.09.2023</a:t>
             </a:fld>
             <a:endParaRPr lang="de-DE"/>
           </a:p>
@@ -2945,7 +2950,7 @@
           <a:p>
             <a:fld id="{349B6121-7632-46E6-99AC-E192A8FE4CA1}" type="datetimeFigureOut">
               <a:rPr lang="de-DE" smtClean="0"/>
-              <a:t>12.09.2023</a:t>
+              <a:t>19.09.2023</a:t>
             </a:fld>
             <a:endParaRPr lang="de-DE"/>
           </a:p>
@@ -10238,43 +10243,7 @@
                 </a:solidFill>
                 <a:latin typeface="Cascadia Mono" panose="020B0609020000020004" pitchFamily="49" charset="0"/>
               </a:rPr>
-              <a:t>    //{ property: p </a:t>
-            </a:r>
-            <a:r>
-              <a:rPr lang="de-DE" sz="1000" dirty="0">
-                <a:solidFill>
-                  <a:srgbClr val="000000"/>
-                </a:solidFill>
-                <a:latin typeface="Cascadia Mono" panose="020B0609020000020004" pitchFamily="49" charset="0"/>
-              </a:rPr>
-              <a:t>=&gt;</a:t>
-            </a:r>
-            <a:r>
-              <a:rPr lang="de-DE" sz="1000" dirty="0">
-                <a:solidFill>
-                  <a:srgbClr val="800000"/>
-                </a:solidFill>
-                <a:latin typeface="Cascadia Mono" panose="020B0609020000020004" pitchFamily="49" charset="0"/>
-              </a:rPr>
-              <a:t> </a:t>
-            </a:r>
-            <a:r>
-              <a:rPr lang="de-DE" sz="1000" dirty="0">
-                <a:solidFill>
-                  <a:srgbClr val="000000"/>
-                </a:solidFill>
-                <a:latin typeface="Cascadia Mono" panose="020B0609020000020004" pitchFamily="49" charset="0"/>
-              </a:rPr>
-              <a:t>p</a:t>
-            </a:r>
-            <a:r>
-              <a:rPr lang="en-US" sz="1000" dirty="0">
-                <a:solidFill>
-                  <a:srgbClr val="008000"/>
-                </a:solidFill>
-                <a:latin typeface="Cascadia Mono" panose="020B0609020000020004" pitchFamily="49" charset="0"/>
-              </a:rPr>
-              <a:t>=&gt; </a:t>
+              <a:t>    //{ property: p =&gt; </a:t>
             </a:r>
             <a:r>
               <a:rPr lang="en-US" sz="1000" dirty="0" err="1">
@@ -10381,7 +10350,16 @@
                 </a:solidFill>
                 <a:latin typeface="Cascadia Mono" panose="020B0609020000020004" pitchFamily="49" charset="0"/>
               </a:rPr>
-              <a:t>.</a:t>
+              <a:t>=&gt;</a:t>
+            </a:r>
+            <a:r>
+              <a:rPr lang="de-DE" sz="1000" dirty="0">
+                <a:solidFill>
+                  <a:srgbClr val="800000"/>
+                </a:solidFill>
+                <a:latin typeface="Cascadia Mono" panose="020B0609020000020004" pitchFamily="49" charset="0"/>
+              </a:rPr>
+              <a:t> </a:t>
             </a:r>
             <a:r>
               <a:rPr lang="de-DE" sz="1000" dirty="0" err="1">
@@ -10390,7 +10368,7 @@
                 </a:solidFill>
                 <a:latin typeface="Cascadia Mono" panose="020B0609020000020004" pitchFamily="49" charset="0"/>
               </a:rPr>
-              <a:t>plateNumber</a:t>
+              <a:t>p.plateNumber</a:t>
             </a:r>
             <a:r>
               <a:rPr lang="de-DE" sz="1000" dirty="0">
@@ -26103,6 +26081,15 @@
 </file>
 
 <file path=customXml/item1.xml><?xml version="1.0" encoding="utf-8"?>
+<?mso-contentType ?>
+<FormTemplates xmlns="http://schemas.microsoft.com/sharepoint/v3/contenttype/forms">
+  <Display>DocumentLibraryForm</Display>
+  <Edit>DocumentLibraryForm</Edit>
+  <New>DocumentLibraryForm</New>
+</FormTemplates>
+</file>
+
+<file path=customXml/item2.xml><?xml version="1.0" encoding="utf-8"?>
 <ct:contentTypeSchema xmlns:ct="http://schemas.microsoft.com/office/2006/metadata/contentType" xmlns:ma="http://schemas.microsoft.com/office/2006/metadata/properties/metaAttributes" ct:_="" ma:_="" ma:contentTypeName="Dokument" ma:contentTypeID="0x010100A5E44E582B913E468E5E8FFE187981F9" ma:contentTypeVersion="15" ma:contentTypeDescription="Ein neues Dokument erstellen." ma:contentTypeScope="" ma:versionID="d5350432d6241b24a9c825aea17bcd45">
   <xsd:schema xmlns:xsd="http://www.w3.org/2001/XMLSchema" xmlns:xs="http://www.w3.org/2001/XMLSchema" xmlns:p="http://schemas.microsoft.com/office/2006/metadata/properties" xmlns:ns3="25c0bbcb-c02d-4153-9b68-2f9f8ad43069" xmlns:ns4="7d146de7-811b-417b-9166-54e734e839a8" targetNamespace="http://schemas.microsoft.com/office/2006/metadata/properties" ma:root="true" ma:fieldsID="52935ca25180050b763ec534a86693fb" ns3:_="" ns4:_="">
     <xsd:import namespace="25c0bbcb-c02d-4153-9b68-2f9f8ad43069"/>
@@ -26337,15 +26324,6 @@
 </ct:contentTypeSchema>
 </file>
 
-<file path=customXml/item2.xml><?xml version="1.0" encoding="utf-8"?>
-<?mso-contentType ?>
-<FormTemplates xmlns="http://schemas.microsoft.com/sharepoint/v3/contenttype/forms">
-  <Display>DocumentLibraryForm</Display>
-  <Edit>DocumentLibraryForm</Edit>
-  <New>DocumentLibraryForm</New>
-</FormTemplates>
-</file>
-
 <file path=customXml/item3.xml><?xml version="1.0" encoding="utf-8"?>
 <p:properties xmlns:p="http://schemas.microsoft.com/office/2006/metadata/properties" xmlns:xsi="http://www.w3.org/2001/XMLSchema-instance" xmlns:pc="http://schemas.microsoft.com/office/infopath/2007/PartnerControls">
   <documentManagement>
@@ -26355,6 +26333,14 @@
 </file>
 
 <file path=customXml/itemProps1.xml><?xml version="1.0" encoding="utf-8"?>
+<ds:datastoreItem xmlns:ds="http://schemas.openxmlformats.org/officeDocument/2006/customXml" ds:itemID="{BE119A26-D02D-439C-B6A4-8B19557D40BD}">
+  <ds:schemaRefs>
+    <ds:schemaRef ds:uri="http://schemas.microsoft.com/sharepoint/v3/contenttype/forms"/>
+  </ds:schemaRefs>
+</ds:datastoreItem>
+</file>
+
+<file path=customXml/itemProps2.xml><?xml version="1.0" encoding="utf-8"?>
 <ds:datastoreItem xmlns:ds="http://schemas.openxmlformats.org/officeDocument/2006/customXml" ds:itemID="{86EC98ED-15A0-4FB6-9F08-955585388583}">
   <ds:schemaRefs>
     <ds:schemaRef ds:uri="http://schemas.microsoft.com/office/2006/metadata/contentType"/>
@@ -26369,14 +26355,6 @@
     <ds:schemaRef ds:uri="http://purl.org/dc/elements/1.1/"/>
     <ds:schemaRef ds:uri="http://purl.org/dc/terms/"/>
     <ds:schemaRef ds:uri="http://schemas.microsoft.com/internal/obd"/>
-  </ds:schemaRefs>
-</ds:datastoreItem>
-</file>
-
-<file path=customXml/itemProps2.xml><?xml version="1.0" encoding="utf-8"?>
-<ds:datastoreItem xmlns:ds="http://schemas.openxmlformats.org/officeDocument/2006/customXml" ds:itemID="{BE119A26-D02D-439C-B6A4-8B19557D40BD}">
-  <ds:schemaRefs>
-    <ds:schemaRef ds:uri="http://schemas.microsoft.com/sharepoint/v3/contenttype/forms"/>
   </ds:schemaRefs>
 </ds:datastoreItem>
 </file>

</xml_diff>